<commit_message>
Simple tesselation test shader.
</commit_message>
<xml_diff>
--- a/Docs/RTGI using rasterization.pptx
+++ b/Docs/RTGI using rasterization.pptx
@@ -245,7 +245,7 @@
           <a:p>
             <a:fld id="{76D11FEA-E478-4043-BB11-44D4907EBA6E}" type="datetimeFigureOut">
               <a:rPr lang="en-US" smtClean="0"/>
-              <a:t>9/3/2014</a:t>
+              <a:t>9/6/2014</a:t>
             </a:fld>
             <a:endParaRPr lang="en-US"/>
           </a:p>
@@ -415,7 +415,7 @@
           <a:p>
             <a:fld id="{76D11FEA-E478-4043-BB11-44D4907EBA6E}" type="datetimeFigureOut">
               <a:rPr lang="en-US" smtClean="0"/>
-              <a:t>9/3/2014</a:t>
+              <a:t>9/6/2014</a:t>
             </a:fld>
             <a:endParaRPr lang="en-US"/>
           </a:p>
@@ -595,7 +595,7 @@
           <a:p>
             <a:fld id="{76D11FEA-E478-4043-BB11-44D4907EBA6E}" type="datetimeFigureOut">
               <a:rPr lang="en-US" smtClean="0"/>
-              <a:t>9/3/2014</a:t>
+              <a:t>9/6/2014</a:t>
             </a:fld>
             <a:endParaRPr lang="en-US"/>
           </a:p>
@@ -765,7 +765,7 @@
           <a:p>
             <a:fld id="{76D11FEA-E478-4043-BB11-44D4907EBA6E}" type="datetimeFigureOut">
               <a:rPr lang="en-US" smtClean="0"/>
-              <a:t>9/3/2014</a:t>
+              <a:t>9/6/2014</a:t>
             </a:fld>
             <a:endParaRPr lang="en-US"/>
           </a:p>
@@ -1011,7 +1011,7 @@
           <a:p>
             <a:fld id="{76D11FEA-E478-4043-BB11-44D4907EBA6E}" type="datetimeFigureOut">
               <a:rPr lang="en-US" smtClean="0"/>
-              <a:t>9/3/2014</a:t>
+              <a:t>9/6/2014</a:t>
             </a:fld>
             <a:endParaRPr lang="en-US"/>
           </a:p>
@@ -1243,7 +1243,7 @@
           <a:p>
             <a:fld id="{76D11FEA-E478-4043-BB11-44D4907EBA6E}" type="datetimeFigureOut">
               <a:rPr lang="en-US" smtClean="0"/>
-              <a:t>9/3/2014</a:t>
+              <a:t>9/6/2014</a:t>
             </a:fld>
             <a:endParaRPr lang="en-US"/>
           </a:p>
@@ -1610,7 +1610,7 @@
           <a:p>
             <a:fld id="{76D11FEA-E478-4043-BB11-44D4907EBA6E}" type="datetimeFigureOut">
               <a:rPr lang="en-US" smtClean="0"/>
-              <a:t>9/3/2014</a:t>
+              <a:t>9/6/2014</a:t>
             </a:fld>
             <a:endParaRPr lang="en-US"/>
           </a:p>
@@ -1728,7 +1728,7 @@
           <a:p>
             <a:fld id="{76D11FEA-E478-4043-BB11-44D4907EBA6E}" type="datetimeFigureOut">
               <a:rPr lang="en-US" smtClean="0"/>
-              <a:t>9/3/2014</a:t>
+              <a:t>9/6/2014</a:t>
             </a:fld>
             <a:endParaRPr lang="en-US"/>
           </a:p>
@@ -1823,7 +1823,7 @@
           <a:p>
             <a:fld id="{76D11FEA-E478-4043-BB11-44D4907EBA6E}" type="datetimeFigureOut">
               <a:rPr lang="en-US" smtClean="0"/>
-              <a:t>9/3/2014</a:t>
+              <a:t>9/6/2014</a:t>
             </a:fld>
             <a:endParaRPr lang="en-US"/>
           </a:p>
@@ -2100,7 +2100,7 @@
           <a:p>
             <a:fld id="{76D11FEA-E478-4043-BB11-44D4907EBA6E}" type="datetimeFigureOut">
               <a:rPr lang="en-US" smtClean="0"/>
-              <a:t>9/3/2014</a:t>
+              <a:t>9/6/2014</a:t>
             </a:fld>
             <a:endParaRPr lang="en-US"/>
           </a:p>
@@ -2353,7 +2353,7 @@
           <a:p>
             <a:fld id="{76D11FEA-E478-4043-BB11-44D4907EBA6E}" type="datetimeFigureOut">
               <a:rPr lang="en-US" smtClean="0"/>
-              <a:t>9/3/2014</a:t>
+              <a:t>9/6/2014</a:t>
             </a:fld>
             <a:endParaRPr lang="en-US"/>
           </a:p>
@@ -2566,7 +2566,7 @@
           <a:p>
             <a:fld id="{76D11FEA-E478-4043-BB11-44D4907EBA6E}" type="datetimeFigureOut">
               <a:rPr lang="en-US" smtClean="0"/>
-              <a:t>9/3/2014</a:t>
+              <a:t>9/6/2014</a:t>
             </a:fld>
             <a:endParaRPr lang="en-US"/>
           </a:p>
@@ -4130,15 +4130,15 @@
         </p:spPr>
         <p:style>
           <a:lnRef idx="2">
-            <a:schemeClr val="accent1">
+            <a:schemeClr val="accent6">
               <a:shade val="50000"/>
             </a:schemeClr>
           </a:lnRef>
           <a:fillRef idx="1">
-            <a:schemeClr val="accent1"/>
+            <a:schemeClr val="accent6"/>
           </a:fillRef>
           <a:effectRef idx="0">
-            <a:schemeClr val="accent1"/>
+            <a:schemeClr val="accent6"/>
           </a:effectRef>
           <a:fontRef idx="minor">
             <a:schemeClr val="lt1"/>

</xml_diff>

<commit_message>
Working on ISM demo.
</commit_message>
<xml_diff>
--- a/Docs/RTGI using rasterization.pptx
+++ b/Docs/RTGI using rasterization.pptx
@@ -3930,15 +3930,15 @@
         </p:spPr>
         <p:style>
           <a:lnRef idx="2">
-            <a:schemeClr val="accent1">
+            <a:schemeClr val="accent6">
               <a:shade val="50000"/>
             </a:schemeClr>
           </a:lnRef>
           <a:fillRef idx="1">
-            <a:schemeClr val="accent1"/>
+            <a:schemeClr val="accent6"/>
           </a:fillRef>
           <a:effectRef idx="0">
-            <a:schemeClr val="accent1"/>
+            <a:schemeClr val="accent6"/>
           </a:effectRef>
           <a:fontRef idx="minor">
             <a:schemeClr val="lt1"/>

</xml_diff>